<commit_message>
Update AJP (01ce0502) - Unit 7 - Spring.pptx
</commit_message>
<xml_diff>
--- a/AJP Slides/AJP (01ce0502) - Unit 7 - Spring.pptx
+++ b/AJP Slides/AJP (01ce0502) - Unit 7 - Spring.pptx
@@ -5016,25 +5016,7 @@
                 </a:solidFill>
                 <a:latin typeface="Cambria" pitchFamily="18" charset="0"/>
               </a:rPr>
-              <a:t>Java </a:t>
-            </a:r>
-            <a:r>
-              <a:rPr lang="en-US" sz="5400" b="1" dirty="0" smtClean="0">
-                <a:solidFill>
-                  <a:srgbClr val="0070C0"/>
-                </a:solidFill>
-                <a:latin typeface="Cambria" pitchFamily="18" charset="0"/>
-              </a:rPr>
-              <a:t>Web Frameworks: </a:t>
-            </a:r>
-            <a:r>
-              <a:rPr lang="en-US" sz="5400" b="1" dirty="0" smtClean="0">
-                <a:solidFill>
-                  <a:srgbClr val="0070C0"/>
-                </a:solidFill>
-                <a:latin typeface="Cambria" pitchFamily="18" charset="0"/>
-              </a:rPr>
-              <a:t/>
+              <a:t>Java Web Frameworks: </a:t>
             </a:r>
             <a:br>
               <a:rPr lang="en-US" sz="5400" b="1" dirty="0" smtClean="0">
@@ -5051,16 +5033,7 @@
                 </a:solidFill>
                 <a:latin typeface="Cambria" pitchFamily="18" charset="0"/>
               </a:rPr>
-              <a:t>Spring </a:t>
-            </a:r>
-            <a:r>
-              <a:rPr lang="en-US" sz="5400" b="1" dirty="0" smtClean="0">
-                <a:solidFill>
-                  <a:srgbClr val="0070C0"/>
-                </a:solidFill>
-                <a:latin typeface="Cambria" pitchFamily="18" charset="0"/>
-              </a:rPr>
-              <a:t>MVC</a:t>
+              <a:t>Spring MVC</a:t>
             </a:r>
             <a:endParaRPr lang="en-IN" sz="5400" b="1" cap="none" dirty="0">
               <a:solidFill>
@@ -5123,12 +5096,6 @@
               </a:rPr>
               <a:t>Programming</a:t>
             </a:r>
-            <a:endParaRPr lang="en-US" sz="3200" b="1" dirty="0" smtClean="0">
-              <a:solidFill>
-                <a:schemeClr val="tx1"/>
-              </a:solidFill>
-              <a:latin typeface="Cambria" pitchFamily="18" charset="0"/>
-            </a:endParaRPr>
           </a:p>
         </p:txBody>
       </p:sp>
@@ -5305,7 +5272,21 @@
                 <a:latin typeface="Raleway" pitchFamily="34" charset="0"/>
                 <a:cs typeface="Arial" pitchFamily="34" charset="0"/>
               </a:rPr>
-              <a:t> 4.0 International </a:t>
+              <a:t> 4.0 International License.</a:t>
+            </a:r>
+            <a:r>
+              <a:rPr kumimoji="0" lang="en-US" sz="1100" b="0" i="0" u="none" strike="noStrike" cap="none" normalizeH="0" dirty="0" smtClean="0">
+                <a:ln>
+                  <a:noFill/>
+                </a:ln>
+                <a:solidFill>
+                  <a:srgbClr val="000000"/>
+                </a:solidFill>
+                <a:effectLst/>
+                <a:latin typeface="Raleway" pitchFamily="34" charset="0"/>
+                <a:cs typeface="Arial" pitchFamily="34" charset="0"/>
+              </a:rPr>
+              <a:t> </a:t>
             </a:r>
             <a:r>
               <a:rPr kumimoji="0" lang="en-US" sz="1100" b="0" i="0" u="none" strike="noStrike" cap="none" normalizeH="0" baseline="0" dirty="0" smtClean="0">
@@ -5319,49 +5300,7 @@
                 <a:latin typeface="Raleway" pitchFamily="34" charset="0"/>
                 <a:cs typeface="Arial" pitchFamily="34" charset="0"/>
               </a:rPr>
-              <a:t>License.</a:t>
-            </a:r>
-            <a:r>
-              <a:rPr kumimoji="0" lang="en-US" sz="1100" b="0" i="0" u="none" strike="noStrike" cap="none" normalizeH="0" dirty="0" smtClean="0">
-                <a:ln>
-                  <a:noFill/>
-                </a:ln>
-                <a:solidFill>
-                  <a:srgbClr val="000000"/>
-                </a:solidFill>
-                <a:effectLst/>
-                <a:latin typeface="Raleway" pitchFamily="34" charset="0"/>
-                <a:cs typeface="Arial" pitchFamily="34" charset="0"/>
-              </a:rPr>
-              <a:t> </a:t>
-            </a:r>
-            <a:r>
-              <a:rPr kumimoji="0" lang="en-US" sz="1100" b="0" i="0" u="none" strike="noStrike" cap="none" normalizeH="0" baseline="0" dirty="0" smtClean="0">
-                <a:ln>
-                  <a:noFill/>
-                </a:ln>
-                <a:solidFill>
-                  <a:srgbClr val="000000"/>
-                </a:solidFill>
-                <a:effectLst/>
-                <a:latin typeface="Raleway" pitchFamily="34" charset="0"/>
-                <a:cs typeface="Arial" pitchFamily="34" charset="0"/>
-              </a:rPr>
-              <a:t>You </a:t>
-            </a:r>
-            <a:r>
-              <a:rPr kumimoji="0" lang="en-US" sz="1100" b="0" i="0" u="none" strike="noStrike" cap="none" normalizeH="0" baseline="0" dirty="0" smtClean="0">
-                <a:ln>
-                  <a:noFill/>
-                </a:ln>
-                <a:solidFill>
-                  <a:srgbClr val="000000"/>
-                </a:solidFill>
-                <a:effectLst/>
-                <a:latin typeface="Raleway" pitchFamily="34" charset="0"/>
-                <a:cs typeface="Arial" pitchFamily="34" charset="0"/>
-              </a:rPr>
-              <a:t>are free to use, distribute and modify it, for noncommercial purposes only, provided you acknowledge the source.</a:t>
+              <a:t>You are free to use, distribute and modify it, for noncommercial purposes only, provided you acknowledge the source.</a:t>
             </a:r>
             <a:endParaRPr kumimoji="0" lang="en-US" sz="1400" b="0" i="0" u="none" strike="noStrike" cap="none" normalizeH="0" baseline="0" dirty="0" smtClean="0">
               <a:ln>
@@ -7840,23 +7779,8 @@
                 </a:solidFill>
                 <a:latin typeface="Cambria" pitchFamily="18" charset="0"/>
               </a:rPr>
-              <a:t>Introduction </a:t>
-            </a:r>
-            <a:r>
-              <a:rPr lang="en-US" sz="3200" b="1" dirty="0" smtClean="0">
-                <a:solidFill>
-                  <a:schemeClr val="tx2"/>
-                </a:solidFill>
-                <a:latin typeface="Cambria" pitchFamily="18" charset="0"/>
-              </a:rPr>
-              <a:t>to Spring</a:t>
-            </a:r>
-            <a:endParaRPr lang="en-US" sz="3200" b="1" dirty="0" smtClean="0">
-              <a:solidFill>
-                <a:schemeClr val="tx2"/>
-              </a:solidFill>
-              <a:latin typeface="Cambria" pitchFamily="18" charset="0"/>
-            </a:endParaRPr>
+              <a:t>Introduction to Spring</a:t>
+            </a:r>
           </a:p>
         </p:txBody>
       </p:sp>
@@ -10676,23 +10600,8 @@
                 </a:solidFill>
                 <a:latin typeface="Cambria" pitchFamily="18" charset="0"/>
               </a:rPr>
-              <a:t>Introduction </a:t>
-            </a:r>
-            <a:r>
-              <a:rPr lang="en-US" sz="3200" b="1" dirty="0" smtClean="0">
-                <a:solidFill>
-                  <a:schemeClr val="tx2"/>
-                </a:solidFill>
-                <a:latin typeface="Cambria" pitchFamily="18" charset="0"/>
-              </a:rPr>
-              <a:t>to Spring</a:t>
-            </a:r>
-            <a:endParaRPr lang="en-US" sz="3200" b="1" dirty="0" smtClean="0">
-              <a:solidFill>
-                <a:schemeClr val="tx2"/>
-              </a:solidFill>
-              <a:latin typeface="Cambria" pitchFamily="18" charset="0"/>
-            </a:endParaRPr>
+              <a:t>Introduction to Spring</a:t>
+            </a:r>
           </a:p>
         </p:txBody>
       </p:sp>
@@ -10762,12 +10671,6 @@
               </a:rPr>
               <a:t>Dependency Injection</a:t>
             </a:r>
-            <a:endParaRPr lang="en-US" sz="3200" b="1" dirty="0">
-              <a:solidFill>
-                <a:schemeClr val="tx2"/>
-              </a:solidFill>
-              <a:latin typeface="Cambria" pitchFamily="18" charset="0"/>
-            </a:endParaRPr>
           </a:p>
         </p:txBody>
       </p:sp>
@@ -11672,7 +11575,19 @@
           <a:p>
             <a:r>
               <a:rPr lang="en-US" dirty="0" smtClean="0"/>
-              <a:t>// do some destruction work</a:t>
+              <a:t>// do </a:t>
+            </a:r>
+            <a:r>
+              <a:rPr lang="en-US" smtClean="0"/>
+              <a:t>some </a:t>
+            </a:r>
+            <a:r>
+              <a:rPr lang="en-US" smtClean="0"/>
+              <a:t>initialization </a:t>
+            </a:r>
+            <a:r>
+              <a:rPr lang="en-US" dirty="0" smtClean="0"/>
+              <a:t>work</a:t>
             </a:r>
           </a:p>
           <a:p>
@@ -16215,10 +16130,10 @@
 <file path=ppt/tags/tag1.xml><?xml version="1.0" encoding="utf-8"?>
 <p:tagLst xmlns:a="http://schemas.openxmlformats.org/drawingml/2006/main" xmlns:r="http://schemas.openxmlformats.org/officeDocument/2006/relationships" xmlns:p="http://schemas.openxmlformats.org/presentationml/2006/main">
   <p:tag name="ARTICULATE_SLIDE_COUNT" val="50"/>
-  <p:tag name="ARTICULATE_PROJECT_OPEN" val="0"/>
   <p:tag name="ARTICULATE_DESIGN_ID_OFFICE THEME" val="nKXpwfSd"/>
   <p:tag name="ARTICULATE_SLIDE_THUMBNAIL_REFRESH" val="1"/>
   <p:tag name="ARTICULATE_DESIGN_ID_BASIS" val="uiBfCZjp"/>
+  <p:tag name="ARTICULATE_PROJECT_OPEN" val="0"/>
 </p:tagLst>
 </file>
 

</xml_diff>